<commit_message>
Updt SamplePPD Rmarkdown rmd
</commit_message>
<xml_diff>
--- a/SamplePPD.pptx
+++ b/SamplePPD.pptx
@@ -166,10 +166,9 @@
           <a:lstStyle/>
           <a:p>
             <a:r>
-              <a:rPr lang="en-US" smtClean="0"/>
+              <a:rPr lang="en-US"/>
               <a:t>Click to edit Master title style</a:t>
             </a:r>
-            <a:endParaRPr lang="en-US"/>
           </a:p>
         </p:txBody>
       </p:sp>
@@ -285,10 +284,9 @@
           </a:lstStyle>
           <a:p>
             <a:r>
-              <a:rPr lang="en-US" smtClean="0"/>
+              <a:rPr lang="en-US"/>
               <a:t>Click to edit Master subtitle style</a:t>
             </a:r>
-            <a:endParaRPr lang="en-US"/>
           </a:p>
         </p:txBody>
       </p:sp>
@@ -309,7 +307,7 @@
           <a:p>
             <a:fld id="{241EB5C9-1307-BA42-ABA2-0BC069CD8E7F}" type="datetimeFigureOut">
               <a:rPr lang="en-US" smtClean="0"/>
-              <a:t>4/5/2019</a:t>
+              <a:t>11/15/20</a:t>
             </a:fld>
             <a:endParaRPr lang="en-US"/>
           </a:p>
@@ -403,10 +401,9 @@
           <a:lstStyle/>
           <a:p>
             <a:r>
-              <a:rPr lang="en-US" smtClean="0"/>
+              <a:rPr lang="en-US"/>
               <a:t>Click to edit Master title style</a:t>
             </a:r>
-            <a:endParaRPr lang="en-US"/>
           </a:p>
         </p:txBody>
       </p:sp>
@@ -427,38 +424,37 @@
           <a:p>
             <a:pPr lvl="0"/>
             <a:r>
-              <a:rPr lang="en-US" smtClean="0"/>
+              <a:rPr lang="en-US"/>
               <a:t>Click to edit Master text styles</a:t>
             </a:r>
           </a:p>
           <a:p>
             <a:pPr lvl="1"/>
             <a:r>
-              <a:rPr lang="en-US" smtClean="0"/>
+              <a:rPr lang="en-US"/>
               <a:t>Second level</a:t>
             </a:r>
           </a:p>
           <a:p>
             <a:pPr lvl="2"/>
             <a:r>
-              <a:rPr lang="en-US" smtClean="0"/>
+              <a:rPr lang="en-US"/>
               <a:t>Third level</a:t>
             </a:r>
           </a:p>
           <a:p>
             <a:pPr lvl="3"/>
             <a:r>
-              <a:rPr lang="en-US" smtClean="0"/>
+              <a:rPr lang="en-US"/>
               <a:t>Fourth level</a:t>
             </a:r>
           </a:p>
           <a:p>
             <a:pPr lvl="4"/>
             <a:r>
-              <a:rPr lang="en-US" smtClean="0"/>
+              <a:rPr lang="en-US"/>
               <a:t>Fifth level</a:t>
             </a:r>
-            <a:endParaRPr lang="en-US"/>
           </a:p>
         </p:txBody>
       </p:sp>
@@ -479,7 +475,7 @@
           <a:p>
             <a:fld id="{241EB5C9-1307-BA42-ABA2-0BC069CD8E7F}" type="datetimeFigureOut">
               <a:rPr lang="en-US" smtClean="0"/>
-              <a:t>4/5/2019</a:t>
+              <a:t>11/15/20</a:t>
             </a:fld>
             <a:endParaRPr lang="en-US"/>
           </a:p>
@@ -578,10 +574,9 @@
           <a:lstStyle/>
           <a:p>
             <a:r>
-              <a:rPr lang="en-US" smtClean="0"/>
+              <a:rPr lang="en-US"/>
               <a:t>Click to edit Master title style</a:t>
             </a:r>
-            <a:endParaRPr lang="en-US"/>
           </a:p>
         </p:txBody>
       </p:sp>
@@ -607,38 +602,37 @@
           <a:p>
             <a:pPr lvl="0"/>
             <a:r>
-              <a:rPr lang="en-US" smtClean="0"/>
+              <a:rPr lang="en-US"/>
               <a:t>Click to edit Master text styles</a:t>
             </a:r>
           </a:p>
           <a:p>
             <a:pPr lvl="1"/>
             <a:r>
-              <a:rPr lang="en-US" smtClean="0"/>
+              <a:rPr lang="en-US"/>
               <a:t>Second level</a:t>
             </a:r>
           </a:p>
           <a:p>
             <a:pPr lvl="2"/>
             <a:r>
-              <a:rPr lang="en-US" smtClean="0"/>
+              <a:rPr lang="en-US"/>
               <a:t>Third level</a:t>
             </a:r>
           </a:p>
           <a:p>
             <a:pPr lvl="3"/>
             <a:r>
-              <a:rPr lang="en-US" smtClean="0"/>
+              <a:rPr lang="en-US"/>
               <a:t>Fourth level</a:t>
             </a:r>
           </a:p>
           <a:p>
             <a:pPr lvl="4"/>
             <a:r>
-              <a:rPr lang="en-US" smtClean="0"/>
+              <a:rPr lang="en-US"/>
               <a:t>Fifth level</a:t>
             </a:r>
-            <a:endParaRPr lang="en-US"/>
           </a:p>
         </p:txBody>
       </p:sp>
@@ -659,7 +653,7 @@
           <a:p>
             <a:fld id="{241EB5C9-1307-BA42-ABA2-0BC069CD8E7F}" type="datetimeFigureOut">
               <a:rPr lang="en-US" smtClean="0"/>
-              <a:t>4/5/2019</a:t>
+              <a:t>11/15/20</a:t>
             </a:fld>
             <a:endParaRPr lang="en-US"/>
           </a:p>
@@ -753,10 +747,9 @@
           <a:lstStyle/>
           <a:p>
             <a:r>
-              <a:rPr lang="en-US" smtClean="0"/>
+              <a:rPr lang="en-US"/>
               <a:t>Click to edit Master title style</a:t>
             </a:r>
-            <a:endParaRPr lang="en-US"/>
           </a:p>
         </p:txBody>
       </p:sp>
@@ -777,38 +770,37 @@
           <a:p>
             <a:pPr lvl="0"/>
             <a:r>
-              <a:rPr lang="en-US" smtClean="0"/>
+              <a:rPr lang="en-US"/>
               <a:t>Click to edit Master text styles</a:t>
             </a:r>
           </a:p>
           <a:p>
             <a:pPr lvl="1"/>
             <a:r>
-              <a:rPr lang="en-US" smtClean="0"/>
+              <a:rPr lang="en-US"/>
               <a:t>Second level</a:t>
             </a:r>
           </a:p>
           <a:p>
             <a:pPr lvl="2"/>
             <a:r>
-              <a:rPr lang="en-US" smtClean="0"/>
+              <a:rPr lang="en-US"/>
               <a:t>Third level</a:t>
             </a:r>
           </a:p>
           <a:p>
             <a:pPr lvl="3"/>
             <a:r>
-              <a:rPr lang="en-US" smtClean="0"/>
+              <a:rPr lang="en-US"/>
               <a:t>Fourth level</a:t>
             </a:r>
           </a:p>
           <a:p>
             <a:pPr lvl="4"/>
             <a:r>
-              <a:rPr lang="en-US" smtClean="0"/>
+              <a:rPr lang="en-US"/>
               <a:t>Fifth level</a:t>
             </a:r>
-            <a:endParaRPr lang="en-US"/>
           </a:p>
         </p:txBody>
       </p:sp>
@@ -829,7 +821,7 @@
           <a:p>
             <a:fld id="{241EB5C9-1307-BA42-ABA2-0BC069CD8E7F}" type="datetimeFigureOut">
               <a:rPr lang="en-US" smtClean="0"/>
-              <a:t>4/5/2019</a:t>
+              <a:t>11/15/20</a:t>
             </a:fld>
             <a:endParaRPr lang="en-US"/>
           </a:p>
@@ -932,10 +924,9 @@
           </a:lstStyle>
           <a:p>
             <a:r>
-              <a:rPr lang="en-US" smtClean="0"/>
+              <a:rPr lang="en-US"/>
               <a:t>Click to edit Master title style</a:t>
             </a:r>
-            <a:endParaRPr lang="en-US"/>
           </a:p>
         </p:txBody>
       </p:sp>
@@ -1052,7 +1043,7 @@
           <a:p>
             <a:pPr lvl="0"/>
             <a:r>
-              <a:rPr lang="en-US" smtClean="0"/>
+              <a:rPr lang="en-US"/>
               <a:t>Click to edit Master text styles</a:t>
             </a:r>
           </a:p>
@@ -1075,7 +1066,7 @@
           <a:p>
             <a:fld id="{241EB5C9-1307-BA42-ABA2-0BC069CD8E7F}" type="datetimeFigureOut">
               <a:rPr lang="en-US" smtClean="0"/>
-              <a:t>4/5/2019</a:t>
+              <a:t>11/15/20</a:t>
             </a:fld>
             <a:endParaRPr lang="en-US"/>
           </a:p>
@@ -1169,10 +1160,9 @@
           <a:lstStyle/>
           <a:p>
             <a:r>
-              <a:rPr lang="en-US" smtClean="0"/>
+              <a:rPr lang="en-US"/>
               <a:t>Click to edit Master title style</a:t>
             </a:r>
-            <a:endParaRPr lang="en-US"/>
           </a:p>
         </p:txBody>
       </p:sp>
@@ -1226,38 +1216,37 @@
           <a:p>
             <a:pPr lvl="0"/>
             <a:r>
-              <a:rPr lang="en-US" smtClean="0"/>
+              <a:rPr lang="en-US"/>
               <a:t>Click to edit Master text styles</a:t>
             </a:r>
           </a:p>
           <a:p>
             <a:pPr lvl="1"/>
             <a:r>
-              <a:rPr lang="en-US" smtClean="0"/>
+              <a:rPr lang="en-US"/>
               <a:t>Second level</a:t>
             </a:r>
           </a:p>
           <a:p>
             <a:pPr lvl="2"/>
             <a:r>
-              <a:rPr lang="en-US" smtClean="0"/>
+              <a:rPr lang="en-US"/>
               <a:t>Third level</a:t>
             </a:r>
           </a:p>
           <a:p>
             <a:pPr lvl="3"/>
             <a:r>
-              <a:rPr lang="en-US" smtClean="0"/>
+              <a:rPr lang="en-US"/>
               <a:t>Fourth level</a:t>
             </a:r>
           </a:p>
           <a:p>
             <a:pPr lvl="4"/>
             <a:r>
-              <a:rPr lang="en-US" smtClean="0"/>
+              <a:rPr lang="en-US"/>
               <a:t>Fifth level</a:t>
             </a:r>
-            <a:endParaRPr lang="en-US"/>
           </a:p>
         </p:txBody>
       </p:sp>
@@ -1311,38 +1300,37 @@
           <a:p>
             <a:pPr lvl="0"/>
             <a:r>
-              <a:rPr lang="en-US" smtClean="0"/>
+              <a:rPr lang="en-US"/>
               <a:t>Click to edit Master text styles</a:t>
             </a:r>
           </a:p>
           <a:p>
             <a:pPr lvl="1"/>
             <a:r>
-              <a:rPr lang="en-US" smtClean="0"/>
+              <a:rPr lang="en-US"/>
               <a:t>Second level</a:t>
             </a:r>
           </a:p>
           <a:p>
             <a:pPr lvl="2"/>
             <a:r>
-              <a:rPr lang="en-US" smtClean="0"/>
+              <a:rPr lang="en-US"/>
               <a:t>Third level</a:t>
             </a:r>
           </a:p>
           <a:p>
             <a:pPr lvl="3"/>
             <a:r>
-              <a:rPr lang="en-US" smtClean="0"/>
+              <a:rPr lang="en-US"/>
               <a:t>Fourth level</a:t>
             </a:r>
           </a:p>
           <a:p>
             <a:pPr lvl="4"/>
             <a:r>
-              <a:rPr lang="en-US" smtClean="0"/>
+              <a:rPr lang="en-US"/>
               <a:t>Fifth level</a:t>
             </a:r>
-            <a:endParaRPr lang="en-US"/>
           </a:p>
         </p:txBody>
       </p:sp>
@@ -1363,7 +1351,7 @@
           <a:p>
             <a:fld id="{241EB5C9-1307-BA42-ABA2-0BC069CD8E7F}" type="datetimeFigureOut">
               <a:rPr lang="en-US" smtClean="0"/>
-              <a:t>4/5/2019</a:t>
+              <a:t>11/15/20</a:t>
             </a:fld>
             <a:endParaRPr lang="en-US"/>
           </a:p>
@@ -1461,10 +1449,9 @@
           </a:lstStyle>
           <a:p>
             <a:r>
-              <a:rPr lang="en-US" smtClean="0"/>
+              <a:rPr lang="en-US"/>
               <a:t>Click to edit Master title style</a:t>
             </a:r>
-            <a:endParaRPr lang="en-US"/>
           </a:p>
         </p:txBody>
       </p:sp>
@@ -1527,7 +1514,7 @@
           <a:p>
             <a:pPr lvl="0"/>
             <a:r>
-              <a:rPr lang="en-US" smtClean="0"/>
+              <a:rPr lang="en-US"/>
               <a:t>Click to edit Master text styles</a:t>
             </a:r>
           </a:p>
@@ -1583,38 +1570,37 @@
           <a:p>
             <a:pPr lvl="0"/>
             <a:r>
-              <a:rPr lang="en-US" smtClean="0"/>
+              <a:rPr lang="en-US"/>
               <a:t>Click to edit Master text styles</a:t>
             </a:r>
           </a:p>
           <a:p>
             <a:pPr lvl="1"/>
             <a:r>
-              <a:rPr lang="en-US" smtClean="0"/>
+              <a:rPr lang="en-US"/>
               <a:t>Second level</a:t>
             </a:r>
           </a:p>
           <a:p>
             <a:pPr lvl="2"/>
             <a:r>
-              <a:rPr lang="en-US" smtClean="0"/>
+              <a:rPr lang="en-US"/>
               <a:t>Third level</a:t>
             </a:r>
           </a:p>
           <a:p>
             <a:pPr lvl="3"/>
             <a:r>
-              <a:rPr lang="en-US" smtClean="0"/>
+              <a:rPr lang="en-US"/>
               <a:t>Fourth level</a:t>
             </a:r>
           </a:p>
           <a:p>
             <a:pPr lvl="4"/>
             <a:r>
-              <a:rPr lang="en-US" smtClean="0"/>
+              <a:rPr lang="en-US"/>
               <a:t>Fifth level</a:t>
             </a:r>
-            <a:endParaRPr lang="en-US"/>
           </a:p>
         </p:txBody>
       </p:sp>
@@ -1677,7 +1663,7 @@
           <a:p>
             <a:pPr lvl="0"/>
             <a:r>
-              <a:rPr lang="en-US" smtClean="0"/>
+              <a:rPr lang="en-US"/>
               <a:t>Click to edit Master text styles</a:t>
             </a:r>
           </a:p>
@@ -1733,38 +1719,37 @@
           <a:p>
             <a:pPr lvl="0"/>
             <a:r>
-              <a:rPr lang="en-US" smtClean="0"/>
+              <a:rPr lang="en-US"/>
               <a:t>Click to edit Master text styles</a:t>
             </a:r>
           </a:p>
           <a:p>
             <a:pPr lvl="1"/>
             <a:r>
-              <a:rPr lang="en-US" smtClean="0"/>
+              <a:rPr lang="en-US"/>
               <a:t>Second level</a:t>
             </a:r>
           </a:p>
           <a:p>
             <a:pPr lvl="2"/>
             <a:r>
-              <a:rPr lang="en-US" smtClean="0"/>
+              <a:rPr lang="en-US"/>
               <a:t>Third level</a:t>
             </a:r>
           </a:p>
           <a:p>
             <a:pPr lvl="3"/>
             <a:r>
-              <a:rPr lang="en-US" smtClean="0"/>
+              <a:rPr lang="en-US"/>
               <a:t>Fourth level</a:t>
             </a:r>
           </a:p>
           <a:p>
             <a:pPr lvl="4"/>
             <a:r>
-              <a:rPr lang="en-US" smtClean="0"/>
+              <a:rPr lang="en-US"/>
               <a:t>Fifth level</a:t>
             </a:r>
-            <a:endParaRPr lang="en-US"/>
           </a:p>
         </p:txBody>
       </p:sp>
@@ -1785,7 +1770,7 @@
           <a:p>
             <a:fld id="{241EB5C9-1307-BA42-ABA2-0BC069CD8E7F}" type="datetimeFigureOut">
               <a:rPr lang="en-US" smtClean="0"/>
-              <a:t>4/5/2019</a:t>
+              <a:t>11/15/20</a:t>
             </a:fld>
             <a:endParaRPr lang="en-US"/>
           </a:p>
@@ -1879,10 +1864,9 @@
           <a:lstStyle/>
           <a:p>
             <a:r>
-              <a:rPr lang="en-US" smtClean="0"/>
+              <a:rPr lang="en-US"/>
               <a:t>Click to edit Master title style</a:t>
             </a:r>
-            <a:endParaRPr lang="en-US"/>
           </a:p>
         </p:txBody>
       </p:sp>
@@ -1903,7 +1887,7 @@
           <a:p>
             <a:fld id="{241EB5C9-1307-BA42-ABA2-0BC069CD8E7F}" type="datetimeFigureOut">
               <a:rPr lang="en-US" smtClean="0"/>
-              <a:t>4/5/2019</a:t>
+              <a:t>11/15/20</a:t>
             </a:fld>
             <a:endParaRPr lang="en-US"/>
           </a:p>
@@ -1998,7 +1982,7 @@
           <a:p>
             <a:fld id="{241EB5C9-1307-BA42-ABA2-0BC069CD8E7F}" type="datetimeFigureOut">
               <a:rPr lang="en-US" smtClean="0"/>
-              <a:t>4/5/2019</a:t>
+              <a:t>11/15/20</a:t>
             </a:fld>
             <a:endParaRPr lang="en-US"/>
           </a:p>
@@ -2101,10 +2085,9 @@
           </a:lstStyle>
           <a:p>
             <a:r>
-              <a:rPr lang="en-US" smtClean="0"/>
+              <a:rPr lang="en-US"/>
               <a:t>Click to edit Master title style</a:t>
             </a:r>
-            <a:endParaRPr lang="en-US"/>
           </a:p>
         </p:txBody>
       </p:sp>
@@ -2158,38 +2141,37 @@
           <a:p>
             <a:pPr lvl="0"/>
             <a:r>
-              <a:rPr lang="en-US" smtClean="0"/>
+              <a:rPr lang="en-US"/>
               <a:t>Click to edit Master text styles</a:t>
             </a:r>
           </a:p>
           <a:p>
             <a:pPr lvl="1"/>
             <a:r>
-              <a:rPr lang="en-US" smtClean="0"/>
+              <a:rPr lang="en-US"/>
               <a:t>Second level</a:t>
             </a:r>
           </a:p>
           <a:p>
             <a:pPr lvl="2"/>
             <a:r>
-              <a:rPr lang="en-US" smtClean="0"/>
+              <a:rPr lang="en-US"/>
               <a:t>Third level</a:t>
             </a:r>
           </a:p>
           <a:p>
             <a:pPr lvl="3"/>
             <a:r>
-              <a:rPr lang="en-US" smtClean="0"/>
+              <a:rPr lang="en-US"/>
               <a:t>Fourth level</a:t>
             </a:r>
           </a:p>
           <a:p>
             <a:pPr lvl="4"/>
             <a:r>
-              <a:rPr lang="en-US" smtClean="0"/>
+              <a:rPr lang="en-US"/>
               <a:t>Fifth level</a:t>
             </a:r>
-            <a:endParaRPr lang="en-US"/>
           </a:p>
         </p:txBody>
       </p:sp>
@@ -2252,7 +2234,7 @@
           <a:p>
             <a:pPr lvl="0"/>
             <a:r>
-              <a:rPr lang="en-US" smtClean="0"/>
+              <a:rPr lang="en-US"/>
               <a:t>Click to edit Master text styles</a:t>
             </a:r>
           </a:p>
@@ -2275,7 +2257,7 @@
           <a:p>
             <a:fld id="{241EB5C9-1307-BA42-ABA2-0BC069CD8E7F}" type="datetimeFigureOut">
               <a:rPr lang="en-US" smtClean="0"/>
-              <a:t>4/5/2019</a:t>
+              <a:t>11/15/20</a:t>
             </a:fld>
             <a:endParaRPr lang="en-US"/>
           </a:p>
@@ -2378,10 +2360,9 @@
           </a:lstStyle>
           <a:p>
             <a:r>
-              <a:rPr lang="en-US" smtClean="0"/>
+              <a:rPr lang="en-US"/>
               <a:t>Click to edit Master title style</a:t>
             </a:r>
-            <a:endParaRPr lang="en-US"/>
           </a:p>
         </p:txBody>
       </p:sp>
@@ -2505,7 +2486,7 @@
           <a:p>
             <a:pPr lvl="0"/>
             <a:r>
-              <a:rPr lang="en-US" smtClean="0"/>
+              <a:rPr lang="en-US"/>
               <a:t>Click to edit Master text styles</a:t>
             </a:r>
           </a:p>
@@ -2528,7 +2509,7 @@
           <a:p>
             <a:fld id="{241EB5C9-1307-BA42-ABA2-0BC069CD8E7F}" type="datetimeFigureOut">
               <a:rPr lang="en-US" smtClean="0"/>
-              <a:t>4/5/2019</a:t>
+              <a:t>11/15/20</a:t>
             </a:fld>
             <a:endParaRPr lang="en-US"/>
           </a:p>
@@ -2637,10 +2618,9 @@
           <a:lstStyle/>
           <a:p>
             <a:r>
-              <a:rPr lang="en-US" smtClean="0"/>
+              <a:rPr lang="en-US"/>
               <a:t>Click to edit Master title style</a:t>
             </a:r>
-            <a:endParaRPr lang="en-US"/>
           </a:p>
         </p:txBody>
       </p:sp>
@@ -2671,38 +2651,37 @@
           <a:p>
             <a:pPr lvl="0"/>
             <a:r>
-              <a:rPr lang="en-US" smtClean="0"/>
+              <a:rPr lang="en-US"/>
               <a:t>Click to edit Master text styles</a:t>
             </a:r>
           </a:p>
           <a:p>
             <a:pPr lvl="1"/>
             <a:r>
-              <a:rPr lang="en-US" smtClean="0"/>
+              <a:rPr lang="en-US"/>
               <a:t>Second level</a:t>
             </a:r>
           </a:p>
           <a:p>
             <a:pPr lvl="2"/>
             <a:r>
-              <a:rPr lang="en-US" smtClean="0"/>
+              <a:rPr lang="en-US"/>
               <a:t>Third level</a:t>
             </a:r>
           </a:p>
           <a:p>
             <a:pPr lvl="3"/>
             <a:r>
-              <a:rPr lang="en-US" smtClean="0"/>
+              <a:rPr lang="en-US"/>
               <a:t>Fourth level</a:t>
             </a:r>
           </a:p>
           <a:p>
             <a:pPr lvl="4"/>
             <a:r>
-              <a:rPr lang="en-US" smtClean="0"/>
+              <a:rPr lang="en-US"/>
               <a:t>Fifth level</a:t>
             </a:r>
-            <a:endParaRPr lang="en-US"/>
           </a:p>
         </p:txBody>
       </p:sp>
@@ -2741,7 +2720,7 @@
           <a:p>
             <a:fld id="{241EB5C9-1307-BA42-ABA2-0BC069CD8E7F}" type="datetimeFigureOut">
               <a:rPr lang="en-US" smtClean="0"/>
-              <a:t>4/5/2019</a:t>
+              <a:t>11/15/20</a:t>
             </a:fld>
             <a:endParaRPr lang="en-US"/>
           </a:p>
@@ -3136,28 +3115,11 @@
           <a:bodyPr/>
           <a:lstStyle/>
           <a:p>
-            <a:pPr lvl="0" marL="0" indent="0">
+            <a:pPr marL="0" lvl="0" indent="0">
               <a:buNone/>
             </a:pPr>
             <a:r>
-              <a:rPr/>
-              <a:t>SamplePPT</a:t>
-            </a:r>
-            <a:r>
-              <a:rPr/>
-              <a:t> </a:t>
-            </a:r>
-            <a:r>
-              <a:rPr/>
-              <a:t>(PERSI</a:t>
-            </a:r>
-            <a:r>
-              <a:rPr/>
-              <a:t> </a:t>
-            </a:r>
-            <a:r>
-              <a:rPr/>
-              <a:t>graphs)</a:t>
+              <a:t>SamplePPT (PERSI graphs)</a:t>
             </a:r>
           </a:p>
         </p:txBody>
@@ -3182,14 +3144,13 @@
           <a:bodyPr/>
           <a:lstStyle/>
           <a:p>
-            <a:pPr lvl="0" marL="0" indent="0">
+            <a:pPr marL="0" lvl="0" indent="0">
               <a:buNone/>
             </a:pPr>
             <a:br/>
             <a:br/>
             <a:r>
-              <a:rPr/>
-              <a:t>Anil</a:t>
+              <a:t>Anil, Swaroop &amp; Jen</a:t>
             </a:r>
           </a:p>
         </p:txBody>
@@ -3209,11 +3170,10 @@
           <a:bodyPr/>
           <a:lstStyle/>
           <a:p>
-            <a:pPr lvl="0" marL="0" indent="0">
+            <a:pPr marL="0" lvl="0" indent="0">
               <a:buNone/>
             </a:pPr>
             <a:r>
-              <a:rPr/>
               <a:t>11/12/2020</a:t>
             </a:r>
           </a:p>
@@ -3221,6 +3181,9 @@
       </p:sp>
     </p:spTree>
   </p:cSld>
+  <p:clrMapOvr>
+    <a:masterClrMapping/>
+  </p:clrMapOvr>
 </p:sld>
 </file>
 
@@ -3243,47 +3206,63 @@
       </p:grpSpPr>
       <p:sp>
         <p:nvSpPr>
-          <p:cNvPr id="3" name="Content Placeholder 2"/>
-          <p:cNvSpPr>
-            <a:spLocks noGrp="1"/>
-          </p:cNvSpPr>
-          <p:nvPr>
-            <p:ph idx="1"/>
-          </p:nvPr>
-        </p:nvSpPr>
-        <p:spPr/>
-        <p:txBody>
-          <a:bodyPr/>
-          <a:lstStyle/>
-          <a:p>
-            <a:pPr lvl="0" marL="0" indent="0">
+          <p:cNvPr id="2" name="Title 1"/>
+          <p:cNvSpPr>
+            <a:spLocks noGrp="1"/>
+          </p:cNvSpPr>
+          <p:nvPr>
+            <p:ph type="title"/>
+          </p:nvPr>
+        </p:nvSpPr>
+        <p:spPr/>
+        <p:txBody>
+          <a:bodyPr/>
+          <a:lstStyle/>
+          <a:p>
+            <a:pPr marL="0" lvl="0" indent="0">
               <a:buNone/>
             </a:pPr>
             <a:r>
-              <a:rPr/>
-              <a:t>Reference: </a:t>
-            </a:r>
-            <a:r>
-              <a:rPr>
-                <a:hlinkClick r:id="rId2"/>
-              </a:rPr>
-              <a:t>https://rstudio.com/wp-content/uploads/2015/03/rmarkdown-reference.pdf</a:t>
-            </a:r>
-            <a:r>
-              <a:rPr/>
-              <a:t> </a:t>
-            </a:r>
-            <a:r>
-              <a:rPr>
-                <a:hlinkClick r:id="rId3"/>
-              </a:rPr>
-              <a:t>https://bookdown.org/yihui/rmarkdown/</a:t>
-            </a:r>
-          </a:p>
-        </p:txBody>
-      </p:sp>
+              <a:t>A History of Weakening Solvency (2001-2019) w/ R Code</a:t>
+            </a:r>
+          </a:p>
+        </p:txBody>
+      </p:sp>
+      <p:pic>
+        <p:nvPicPr>
+          <p:cNvPr id="3" name="Picture 1" descr="SamplePPD_files/figure-pptx/debt-1.png"/>
+          <p:cNvPicPr>
+            <a:picLocks noGrp="1" noChangeAspect="1"/>
+          </p:cNvPicPr>
+          <p:nvPr/>
+        </p:nvPicPr>
+        <p:blipFill>
+          <a:blip r:embed="rId2"/>
+          <a:stretch>
+            <a:fillRect/>
+          </a:stretch>
+        </p:blipFill>
+        <p:spPr bwMode="auto">
+          <a:xfrm>
+            <a:off x="952500" y="1600200"/>
+            <a:ext cx="7239000" cy="4521200"/>
+          </a:xfrm>
+          <a:prstGeom prst="rect">
+            <a:avLst/>
+          </a:prstGeom>
+          <a:noFill/>
+          <a:ln w="9525">
+            <a:noFill/>
+            <a:headEnd/>
+            <a:tailEnd/>
+          </a:ln>
+        </p:spPr>
+      </p:pic>
     </p:spTree>
   </p:cSld>
+  <p:clrMapOvr>
+    <a:masterClrMapping/>
+  </p:clrMapOvr>
 </p:sld>
 </file>
 
@@ -3319,83 +3298,18 @@
           <a:bodyPr/>
           <a:lstStyle/>
           <a:p>
-            <a:pPr lvl="0" marL="0" indent="0">
+            <a:pPr marL="0" lvl="0" indent="0">
               <a:buNone/>
             </a:pPr>
             <a:r>
-              <a:rPr/>
-              <a:t>A</a:t>
-            </a:r>
-            <a:r>
-              <a:rPr/>
-              <a:t> </a:t>
-            </a:r>
-            <a:r>
-              <a:rPr/>
-              <a:t>History</a:t>
-            </a:r>
-            <a:r>
-              <a:rPr/>
-              <a:t> </a:t>
-            </a:r>
-            <a:r>
-              <a:rPr/>
-              <a:t>of</a:t>
-            </a:r>
-            <a:r>
-              <a:rPr/>
-              <a:t> </a:t>
-            </a:r>
-            <a:r>
-              <a:rPr/>
-              <a:t>Weakening</a:t>
-            </a:r>
-            <a:r>
-              <a:rPr/>
-              <a:t> </a:t>
-            </a:r>
-            <a:r>
-              <a:rPr/>
-              <a:t>Solvency</a:t>
-            </a:r>
-            <a:r>
-              <a:rPr/>
-              <a:t> </a:t>
-            </a:r>
-            <a:r>
-              <a:rPr/>
-              <a:t>(1995-2019)</a:t>
-            </a:r>
-            <a:r>
-              <a:rPr/>
-              <a:t> </a:t>
-            </a:r>
-            <a:r>
-              <a:rPr/>
-              <a:t>w/</a:t>
-            </a:r>
-            <a:r>
-              <a:rPr/>
-              <a:t> </a:t>
-            </a:r>
-            <a:r>
-              <a:rPr/>
-              <a:t>R</a:t>
-            </a:r>
-            <a:r>
-              <a:rPr/>
-              <a:t> </a:t>
-            </a:r>
-            <a:r>
-              <a:rPr/>
-              <a:t>Code</a:t>
+              <a:t>A History of Investment Returns (2001-2019) w/ R Code</a:t>
             </a:r>
           </a:p>
         </p:txBody>
       </p:sp>
       <p:pic>
         <p:nvPicPr>
-          <p:cNvPr descr="SamplePPD_files/figure-pptx/graph-1.png" id="0" name="Picture 1"/>
+          <p:cNvPr id="3" name="Picture 1" descr="SamplePPD_files/figure-pptx/graph-1.png"/>
           <p:cNvPicPr>
             <a:picLocks noGrp="1" noChangeAspect="1"/>
           </p:cNvPicPr>
@@ -3409,8 +3323,8 @@
         </p:blipFill>
         <p:spPr bwMode="auto">
           <a:xfrm>
-            <a:off x="609600" y="1600200"/>
-            <a:ext cx="7912100" cy="4521200"/>
+            <a:off x="952500" y="1600200"/>
+            <a:ext cx="7239000" cy="4521200"/>
           </a:xfrm>
           <a:prstGeom prst="rect">
             <a:avLst/>
@@ -3425,6 +3339,9 @@
       </p:pic>
     </p:spTree>
   </p:cSld>
+  <p:clrMapOvr>
+    <a:masterClrMapping/>
+  </p:clrMapOvr>
 </p:sld>
 </file>
 
@@ -3460,83 +3377,97 @@
           <a:bodyPr/>
           <a:lstStyle/>
           <a:p>
-            <a:pPr lvl="0" marL="0" indent="0">
+            <a:pPr marL="0" lvl="0" indent="0">
               <a:buNone/>
             </a:pPr>
             <a:r>
-              <a:rPr/>
-              <a:t>A</a:t>
-            </a:r>
-            <a:r>
-              <a:rPr/>
-              <a:t> </a:t>
-            </a:r>
-            <a:r>
-              <a:rPr/>
-              <a:t>History</a:t>
-            </a:r>
-            <a:r>
-              <a:rPr/>
-              <a:t> </a:t>
-            </a:r>
-            <a:r>
-              <a:rPr/>
-              <a:t>of</a:t>
-            </a:r>
-            <a:r>
-              <a:rPr/>
-              <a:t> </a:t>
-            </a:r>
-            <a:r>
-              <a:rPr/>
-              <a:t>Weakening</a:t>
-            </a:r>
-            <a:r>
-              <a:rPr/>
-              <a:t> </a:t>
-            </a:r>
-            <a:r>
-              <a:rPr/>
-              <a:t>Solvency</a:t>
-            </a:r>
-            <a:r>
-              <a:rPr/>
-              <a:t> </a:t>
-            </a:r>
-            <a:r>
-              <a:rPr/>
-              <a:t>(1995-2019)</a:t>
-            </a:r>
-            <a:r>
-              <a:rPr/>
-              <a:t> </a:t>
-            </a:r>
-            <a:r>
-              <a:rPr/>
-              <a:t>w/</a:t>
-            </a:r>
-            <a:r>
-              <a:rPr/>
-              <a:t> </a:t>
-            </a:r>
-            <a:r>
-              <a:rPr/>
-              <a:t>Saved</a:t>
-            </a:r>
-            <a:r>
-              <a:rPr/>
-              <a:t> </a:t>
-            </a:r>
-            <a:r>
-              <a:rPr/>
-              <a:t>Img</a:t>
+              <a:t>A Mountain fo Debt Plot w/ Saved Img</a:t>
             </a:r>
           </a:p>
         </p:txBody>
       </p:sp>
       <p:pic>
         <p:nvPicPr>
-          <p:cNvPr descr="graphs/Inv.Returns.PERSI.jpeg" id="0" name="Picture 1"/>
+          <p:cNvPr id="3" name="Picture 1" descr="PERSI.debptPlot2.jpeg"/>
+          <p:cNvPicPr>
+            <a:picLocks noGrp="1" noChangeAspect="1"/>
+          </p:cNvPicPr>
+          <p:nvPr/>
+        </p:nvPicPr>
+        <p:blipFill>
+          <a:blip r:embed="rId2"/>
+          <a:stretch>
+            <a:fillRect/>
+          </a:stretch>
+        </p:blipFill>
+        <p:spPr bwMode="auto">
+          <a:xfrm>
+            <a:off x="2095500" y="1600200"/>
+            <a:ext cx="4965700" cy="4521200"/>
+          </a:xfrm>
+          <a:prstGeom prst="rect">
+            <a:avLst/>
+          </a:prstGeom>
+          <a:noFill/>
+          <a:ln w="9525">
+            <a:noFill/>
+            <a:headEnd/>
+            <a:tailEnd/>
+          </a:ln>
+        </p:spPr>
+      </p:pic>
+    </p:spTree>
+  </p:cSld>
+  <p:clrMapOvr>
+    <a:masterClrMapping/>
+  </p:clrMapOvr>
+</p:sld>
+</file>
+
+<file path=ppt/slides/slide5.xml><?xml version="1.0" encoding="utf-8"?>
+<p:sld xmlns:a="http://schemas.openxmlformats.org/drawingml/2006/main" xmlns:r="http://schemas.openxmlformats.org/officeDocument/2006/relationships" xmlns:p="http://schemas.openxmlformats.org/presentationml/2006/main">
+  <p:cSld>
+    <p:spTree>
+      <p:nvGrpSpPr>
+        <p:cNvPr id="1" name=""/>
+        <p:cNvGrpSpPr/>
+        <p:nvPr/>
+      </p:nvGrpSpPr>
+      <p:grpSpPr>
+        <a:xfrm>
+          <a:off x="0" y="0"/>
+          <a:ext cx="0" cy="0"/>
+          <a:chOff x="0" y="0"/>
+          <a:chExt cx="0" cy="0"/>
+        </a:xfrm>
+      </p:grpSpPr>
+      <p:sp>
+        <p:nvSpPr>
+          <p:cNvPr id="2" name="Title 1"/>
+          <p:cNvSpPr>
+            <a:spLocks noGrp="1"/>
+          </p:cNvSpPr>
+          <p:nvPr>
+            <p:ph type="title"/>
+          </p:nvPr>
+        </p:nvSpPr>
+        <p:spPr/>
+        <p:txBody>
+          <a:bodyPr/>
+          <a:lstStyle/>
+          <a:p>
+            <a:pPr marL="0" lvl="0" indent="0">
+              <a:buNone/>
+            </a:pPr>
+            <a:r>
+              <a:t>A History of Weakening Solvency (2001-2019) w/ Saved Img</a:t>
+            </a:r>
+          </a:p>
+        </p:txBody>
+      </p:sp>
+      <p:pic>
+        <p:nvPicPr>
+          <p:cNvPr id="3" name="Picture 1" descr="graphs/Inv.Returns.PERSI.jpeg"/>
           <p:cNvPicPr>
             <a:picLocks noGrp="1" noChangeAspect="1"/>
           </p:cNvPicPr>
@@ -3566,53 +3497,9 @@
       </p:pic>
     </p:spTree>
   </p:cSld>
-</p:sld>
-</file>
-
-<file path=ppt/slides/slide5.xml><?xml version="1.0" encoding="utf-8"?>
-<p:sld xmlns:a="http://schemas.openxmlformats.org/drawingml/2006/main" xmlns:r="http://schemas.openxmlformats.org/officeDocument/2006/relationships" xmlns:p="http://schemas.openxmlformats.org/presentationml/2006/main">
-  <p:cSld>
-    <p:spTree>
-      <p:nvGrpSpPr>
-        <p:cNvPr id="1" name=""/>
-        <p:cNvGrpSpPr/>
-        <p:nvPr/>
-      </p:nvGrpSpPr>
-      <p:grpSpPr>
-        <a:xfrm>
-          <a:off x="0" y="0"/>
-          <a:ext cx="0" cy="0"/>
-          <a:chOff x="0" y="0"/>
-          <a:chExt cx="0" cy="0"/>
-        </a:xfrm>
-      </p:grpSpPr>
-      <p:sp>
-        <p:nvSpPr>
-          <p:cNvPr id="3" name="Content Placeholder 2"/>
-          <p:cNvSpPr>
-            <a:spLocks noGrp="1"/>
-          </p:cNvSpPr>
-          <p:nvPr>
-            <p:ph idx="1"/>
-          </p:nvPr>
-        </p:nvSpPr>
-        <p:spPr/>
-        <p:txBody>
-          <a:bodyPr/>
-          <a:lstStyle/>
-          <a:p>
-            <a:pPr lvl="0" marL="0" indent="0">
-              <a:buNone/>
-            </a:pPr>
-            <a:r>
-              <a:rPr/>
-              <a:t> ## A Mountain fo Debt Plot w/ Saved Img </a:t>
-            </a:r>
-          </a:p>
-        </p:txBody>
-      </p:sp>
-    </p:spTree>
-  </p:cSld>
+  <p:clrMapOvr>
+    <a:masterClrMapping/>
+  </p:clrMapOvr>
 </p:sld>
 </file>
 
@@ -3648,28 +3535,11 @@
           <a:bodyPr/>
           <a:lstStyle/>
           <a:p>
-            <a:pPr lvl="0" marL="0" indent="0">
+            <a:pPr marL="0" lvl="0" indent="0">
               <a:buNone/>
             </a:pPr>
             <a:r>
-              <a:rPr/>
-              <a:t>Slide</a:t>
-            </a:r>
-            <a:r>
-              <a:rPr/>
-              <a:t> </a:t>
-            </a:r>
-            <a:r>
-              <a:rPr/>
-              <a:t>with</a:t>
-            </a:r>
-            <a:r>
-              <a:rPr/>
-              <a:t> </a:t>
-            </a:r>
-            <a:r>
-              <a:rPr/>
-              <a:t>Bullets</a:t>
+              <a:t>References</a:t>
             </a:r>
           </a:p>
         </p:txBody>
@@ -3691,28 +3561,37 @@
           <a:p>
             <a:pPr lvl="1"/>
             <a:r>
-              <a:rPr/>
-              <a:t>Bullet 1</a:t>
+              <a:rPr>
+                <a:hlinkClick r:id="rId2"/>
+              </a:rPr>
+              <a:t>https://github.com/ReasonFoundation/GraphicsR</a:t>
             </a:r>
           </a:p>
           <a:p>
             <a:pPr lvl="1"/>
             <a:r>
-              <a:rPr/>
-              <a:t>Bullet 2</a:t>
+              <a:rPr>
+                <a:hlinkClick r:id="rId3"/>
+              </a:rPr>
+              <a:t>https://rstudio.com/wp-content/uploads/2015/03/rmarkdown-reference.pdf</a:t>
             </a:r>
           </a:p>
           <a:p>
             <a:pPr lvl="1"/>
             <a:r>
-              <a:rPr/>
-              <a:t>Bullet 3</a:t>
+              <a:rPr>
+                <a:hlinkClick r:id="rId4"/>
+              </a:rPr>
+              <a:t>https://bookdown.org/yihui/rmarkdown/</a:t>
             </a:r>
           </a:p>
         </p:txBody>
       </p:sp>
     </p:spTree>
   </p:cSld>
+  <p:clrMapOvr>
+    <a:masterClrMapping/>
+  </p:clrMapOvr>
 </p:sld>
 </file>
 

</xml_diff>